<commit_message>
changes in readme file
</commit_message>
<xml_diff>
--- a/visual_presentation.pptx
+++ b/visual_presentation.pptx
@@ -744,7 +744,7 @@
             <a:fld id="{1D8BD707-D9CF-40AE-B4C6-C98DA3205C09}" type="datetimeFigureOut">
               <a:rPr lang="en-US" smtClean="0"/>
               <a:pPr/>
-              <a:t>12/14/2023</a:t>
+              <a:t>12/15/2023</a:t>
             </a:fld>
             <a:endParaRPr lang="en-US"/>
           </a:p>
@@ -942,7 +942,7 @@
             <a:fld id="{1D8BD707-D9CF-40AE-B4C6-C98DA3205C09}" type="datetimeFigureOut">
               <a:rPr lang="en-US" smtClean="0"/>
               <a:pPr/>
-              <a:t>12/14/2023</a:t>
+              <a:t>12/15/2023</a:t>
             </a:fld>
             <a:endParaRPr lang="en-US"/>
           </a:p>
@@ -1129,7 +1129,7 @@
             <a:fld id="{1D8BD707-D9CF-40AE-B4C6-C98DA3205C09}" type="datetimeFigureOut">
               <a:rPr lang="en-US" smtClean="0"/>
               <a:pPr/>
-              <a:t>12/14/2023</a:t>
+              <a:t>12/15/2023</a:t>
             </a:fld>
             <a:endParaRPr lang="en-US"/>
           </a:p>
@@ -1281,7 +1281,7 @@
             <a:fld id="{1D8BD707-D9CF-40AE-B4C6-C98DA3205C09}" type="datetimeFigureOut">
               <a:rPr lang="en-US" smtClean="0"/>
               <a:pPr/>
-              <a:t>12/14/2023</a:t>
+              <a:t>12/15/2023</a:t>
             </a:fld>
             <a:endParaRPr lang="en-US"/>
           </a:p>
@@ -1538,7 +1538,7 @@
             <a:fld id="{1D8BD707-D9CF-40AE-B4C6-C98DA3205C09}" type="datetimeFigureOut">
               <a:rPr lang="en-US" smtClean="0"/>
               <a:pPr/>
-              <a:t>12/14/2023</a:t>
+              <a:t>12/15/2023</a:t>
             </a:fld>
             <a:endParaRPr lang="en-US"/>
           </a:p>
@@ -1949,7 +1949,7 @@
             <a:fld id="{1D8BD707-D9CF-40AE-B4C6-C98DA3205C09}" type="datetimeFigureOut">
               <a:rPr lang="en-US" smtClean="0"/>
               <a:pPr/>
-              <a:t>12/14/2023</a:t>
+              <a:t>12/15/2023</a:t>
             </a:fld>
             <a:endParaRPr lang="en-US"/>
           </a:p>
@@ -2397,7 +2397,7 @@
             <a:fld id="{1D8BD707-D9CF-40AE-B4C6-C98DA3205C09}" type="datetimeFigureOut">
               <a:rPr lang="en-US" smtClean="0"/>
               <a:pPr/>
-              <a:t>12/14/2023</a:t>
+              <a:t>12/15/2023</a:t>
             </a:fld>
             <a:endParaRPr lang="en-US"/>
           </a:p>
@@ -2500,7 +2500,7 @@
             <a:fld id="{1D8BD707-D9CF-40AE-B4C6-C98DA3205C09}" type="datetimeFigureOut">
               <a:rPr lang="en-US" smtClean="0"/>
               <a:pPr/>
-              <a:t>12/14/2023</a:t>
+              <a:t>12/15/2023</a:t>
             </a:fld>
             <a:endParaRPr lang="en-US"/>
           </a:p>
@@ -2623,7 +2623,7 @@
             <a:fld id="{1D8BD707-D9CF-40AE-B4C6-C98DA3205C09}" type="datetimeFigureOut">
               <a:rPr lang="en-US" smtClean="0"/>
               <a:pPr/>
-              <a:t>12/14/2023</a:t>
+              <a:t>12/15/2023</a:t>
             </a:fld>
             <a:endParaRPr lang="en-US"/>
           </a:p>
@@ -2899,7 +2899,7 @@
             <a:fld id="{1D8BD707-D9CF-40AE-B4C6-C98DA3205C09}" type="datetimeFigureOut">
               <a:rPr lang="en-US" smtClean="0"/>
               <a:pPr/>
-              <a:t>12/14/2023</a:t>
+              <a:t>12/15/2023</a:t>
             </a:fld>
             <a:endParaRPr lang="en-US"/>
           </a:p>
@@ -3106,7 +3106,7 @@
             <a:fld id="{1D8BD707-D9CF-40AE-B4C6-C98DA3205C09}" type="datetimeFigureOut">
               <a:rPr lang="en-US" smtClean="0"/>
               <a:pPr/>
-              <a:t>12/14/2023</a:t>
+              <a:t>12/15/2023</a:t>
             </a:fld>
             <a:endParaRPr lang="en-US"/>
           </a:p>
@@ -4217,7 +4217,7 @@
             <a:fld id="{1D8BD707-D9CF-40AE-B4C6-C98DA3205C09}" type="datetimeFigureOut">
               <a:rPr lang="en-US" smtClean="0"/>
               <a:pPr/>
-              <a:t>12/14/2023</a:t>
+              <a:t>12/15/2023</a:t>
             </a:fld>
             <a:endParaRPr lang="en-US"/>
           </a:p>
@@ -4673,14 +4673,7 @@
                 <a:latin typeface="Times New Roman" pitchFamily="18" charset="0"/>
                 <a:cs typeface="Times New Roman" pitchFamily="18" charset="0"/>
               </a:rPr>
-              <a:t> </a:t>
-            </a:r>
-            <a:r>
-              <a:rPr lang="en-US" sz="2800" dirty="0" smtClean="0">
-                <a:latin typeface="Times New Roman" pitchFamily="18" charset="0"/>
-                <a:cs typeface="Times New Roman" pitchFamily="18" charset="0"/>
-              </a:rPr>
-              <a:t>Data Analytics </a:t>
+              <a:t> Data Analytics </a:t>
             </a:r>
             <a:r>
               <a:rPr lang="en-US" sz="2800" dirty="0" err="1" smtClean="0">
@@ -4742,13 +4735,6 @@
                 <a:cs typeface="Times New Roman" pitchFamily="18" charset="0"/>
               </a:rPr>
               <a:t>on</a:t>
-            </a:r>
-            <a:r>
-              <a:rPr lang="en-US" sz="3200" dirty="0" smtClean="0">
-                <a:latin typeface="Times New Roman" pitchFamily="18" charset="0"/>
-                <a:cs typeface="Times New Roman" pitchFamily="18" charset="0"/>
-              </a:rPr>
-              <a:t/>
             </a:r>
             <a:br>
               <a:rPr lang="en-US" sz="3200" dirty="0" smtClean="0">
@@ -5048,6 +5034,13 @@
   <p:clrMapOvr>
     <a:masterClrMapping/>
   </p:clrMapOvr>
+  <p:timing>
+    <p:tnLst>
+      <p:par>
+        <p:cTn id="1" dur="indefinite" restart="never" nodeType="tmRoot"/>
+      </p:par>
+    </p:tnLst>
+  </p:timing>
 </p:sld>
 </file>
 
@@ -5142,6 +5135,13 @@
   <p:clrMapOvr>
     <a:masterClrMapping/>
   </p:clrMapOvr>
+  <p:timing>
+    <p:tnLst>
+      <p:par>
+        <p:cTn id="1" dur="indefinite" restart="never" nodeType="tmRoot"/>
+      </p:par>
+    </p:tnLst>
+  </p:timing>
 </p:sld>
 </file>
 
@@ -5900,6 +5900,13 @@
   <p:clrMapOvr>
     <a:masterClrMapping/>
   </p:clrMapOvr>
+  <p:timing>
+    <p:tnLst>
+      <p:par>
+        <p:cTn id="1" dur="indefinite" restart="never" nodeType="tmRoot"/>
+      </p:par>
+    </p:tnLst>
+  </p:timing>
 </p:sld>
 </file>
 

</xml_diff>